<commit_message>
lesson 2 bug fixes
</commit_message>
<xml_diff>
--- a/resources/downloads/Lesson2_EcosystemRestoration.pptx
+++ b/resources/downloads/Lesson2_EcosystemRestoration.pptx
@@ -5537,9 +5537,10 @@
           </a:p>
           <a:p>
             <a:r>
-              <a:rPr lang="en-AU" dirty="0"/>
-              <a:t>Finding information </a:t>
-            </a:r>
+              <a:rPr lang="en-AU"/>
+              <a:t>Finding correct information </a:t>
+            </a:r>
+            <a:endParaRPr lang="en-AU" dirty="0"/>
           </a:p>
           <a:p>
             <a:r>

</xml_diff>